<commit_message>
edit ptt and readme
</commit_message>
<xml_diff>
--- a/Educational_game_2.pptx
+++ b/Educational_game_2.pptx
@@ -6162,25 +6162,8 @@
                   </a:schemeClr>
                 </a:solidFill>
               </a:rPr>
-              <a:t>Educatieve </a:t>
-            </a:r>
-            <a:r>
-              <a:rPr lang="nl-BE" sz="1600" dirty="0" err="1">
-                <a:solidFill>
-                  <a:schemeClr val="bg2">
-                    <a:lumMod val="50000"/>
-                  </a:schemeClr>
-                </a:solidFill>
-              </a:rPr>
-              <a:t>videos</a:t>
-            </a:r>
-            <a:endParaRPr lang="nl-BE" sz="1600" dirty="0">
-              <a:solidFill>
-                <a:schemeClr val="bg2">
-                  <a:lumMod val="50000"/>
-                </a:schemeClr>
-              </a:solidFill>
-            </a:endParaRPr>
+              <a:t>Educatieve video's</a:t>
+            </a:r>
           </a:p>
         </p:txBody>
       </p:sp>
@@ -6422,7 +6405,7 @@
         </p:spPr>
         <p:txBody>
           <a:bodyPr>
-            <a:normAutofit fontScale="92500" lnSpcReduction="10000"/>
+            <a:normAutofit fontScale="85000" lnSpcReduction="10000"/>
           </a:bodyPr>
           <a:lstStyle/>
           <a:p>
@@ -6519,6 +6502,22 @@
                 </a:solidFill>
               </a:rPr>
               <a:t>3 thema's: zee, bos, industrieel</a:t>
+            </a:r>
+          </a:p>
+          <a:p>
+            <a:pPr marL="342900" indent="-342900">
+              <a:buFont typeface="Arial" panose="020B0604020202020204" pitchFamily="34" charset="0"/>
+              <a:buChar char="•"/>
+            </a:pPr>
+            <a:r>
+              <a:rPr lang="nl-NL" dirty="0">
+                <a:solidFill>
+                  <a:schemeClr val="bg2">
+                    <a:lumMod val="50000"/>
+                  </a:schemeClr>
+                </a:solidFill>
+              </a:rPr>
+              <a:t>2 talen: Nederlands en Engels</a:t>
             </a:r>
           </a:p>
           <a:p>
@@ -6970,17 +6969,17 @@
                   </a:schemeClr>
                 </a:solidFill>
               </a:rPr>
-              <a:t>Probleem: O</a:t>
-            </a:r>
-            <a:r>
-              <a:rPr lang="nl-BE" sz="1400" dirty="0" err="1">
+              <a:t>Probleem: </a:t>
+            </a:r>
+            <a:r>
+              <a:rPr lang="nl-BE" sz="1400" dirty="0">
                 <a:solidFill>
                   <a:schemeClr val="bg2">
                     <a:lumMod val="50000"/>
                   </a:schemeClr>
                 </a:solidFill>
               </a:rPr>
-              <a:t>verbevissing</a:t>
+              <a:t>overbevissing</a:t>
             </a:r>
             <a:endParaRPr lang="en-US" sz="1400" dirty="0">
               <a:solidFill>
@@ -8041,7 +8040,7 @@
         <p:spPr>
           <a:xfrm>
             <a:off x="1028790" y="2489528"/>
-            <a:ext cx="3326552" cy="969496"/>
+            <a:ext cx="3400290" cy="1261884"/>
           </a:xfrm>
           <a:prstGeom prst="rect">
             <a:avLst/>
@@ -8076,27 +8075,7 @@
                   </a:schemeClr>
                 </a:solidFill>
               </a:rPr>
-              <a:t>tekst </a:t>
-            </a:r>
-            <a:r>
-              <a:rPr lang="nl-BE" sz="1900" dirty="0" err="1">
-                <a:solidFill>
-                  <a:schemeClr val="bg2">
-                    <a:lumMod val="50000"/>
-                  </a:schemeClr>
-                </a:solidFill>
-              </a:rPr>
-              <a:t>to</a:t>
-            </a:r>
-            <a:r>
-              <a:rPr lang="nl-BE" sz="1900" dirty="0">
-                <a:solidFill>
-                  <a:schemeClr val="bg2">
-                    <a:lumMod val="50000"/>
-                  </a:schemeClr>
-                </a:solidFill>
-              </a:rPr>
-              <a:t> speech</a:t>
+              <a:t>tekst naar spraak</a:t>
             </a:r>
           </a:p>
           <a:p>
@@ -8105,42 +8084,15 @@
               <a:buChar char="•"/>
             </a:pPr>
             <a:r>
-              <a:rPr lang="nl-BE" sz="1900" dirty="0" err="1">
+              <a:rPr lang="nl-BE" sz="1900" dirty="0">
                 <a:solidFill>
                   <a:schemeClr val="bg2">
                     <a:lumMod val="50000"/>
                   </a:schemeClr>
                 </a:solidFill>
               </a:rPr>
-              <a:t>Diavoolstelling</a:t>
-            </a:r>
-            <a:r>
-              <a:rPr lang="nl-BE" sz="1900" dirty="0">
-                <a:solidFill>
-                  <a:schemeClr val="bg2">
-                    <a:lumMod val="50000"/>
-                  </a:schemeClr>
-                </a:solidFill>
-              </a:rPr>
-              <a:t> van </a:t>
-            </a:r>
-            <a:r>
-              <a:rPr lang="nl-BE" sz="1900" dirty="0" err="1">
-                <a:solidFill>
-                  <a:schemeClr val="bg2">
-                    <a:lumMod val="50000"/>
-                  </a:schemeClr>
-                </a:solidFill>
-              </a:rPr>
-              <a:t>fotos</a:t>
-            </a:r>
-            <a:endParaRPr lang="nl-BE" sz="1900" dirty="0">
-              <a:solidFill>
-                <a:schemeClr val="bg2">
-                  <a:lumMod val="50000"/>
-                </a:schemeClr>
-              </a:solidFill>
-            </a:endParaRPr>
+              <a:t>Diavoorstelling van foto's</a:t>
+            </a:r>
           </a:p>
           <a:p>
             <a:pPr marL="285750" indent="-285750">
@@ -8156,6 +8108,22 @@
                 </a:solidFill>
               </a:rPr>
               <a:t>1 – 1.30 min</a:t>
+            </a:r>
+          </a:p>
+          <a:p>
+            <a:pPr marL="285750" indent="-285750">
+              <a:buFont typeface="Arial" panose="020B0604020202020204" pitchFamily="34" charset="0"/>
+              <a:buChar char="•"/>
+            </a:pPr>
+            <a:r>
+              <a:rPr lang="nl-BE" sz="1900" dirty="0">
+                <a:solidFill>
+                  <a:schemeClr val="bg2">
+                    <a:lumMod val="50000"/>
+                  </a:schemeClr>
+                </a:solidFill>
+              </a:rPr>
+              <a:t>In beide talen</a:t>
             </a:r>
           </a:p>
         </p:txBody>

</xml_diff>

<commit_message>
add assets back to memory
</commit_message>
<xml_diff>
--- a/Educational_game_2.pptx
+++ b/Educational_game_2.pptx
@@ -205,7 +205,7 @@
           <a:p>
             <a:fld id="{2EF5C7FB-304D-45A2-B1C7-5D3D2BDAD6C4}" type="datetimeFigureOut">
               <a:rPr lang="nl-BE" smtClean="0"/>
-              <a:t>6/05/2024</a:t>
+              <a:t>13/05/2024</a:t>
             </a:fld>
             <a:endParaRPr lang="nl-BE"/>
           </a:p>
@@ -748,7 +748,7 @@
           <a:p>
             <a:fld id="{B7714D09-FDA9-401A-B706-95D8DDEA38E0}" type="datetimeFigureOut">
               <a:rPr lang="LID4096" smtClean="0"/>
-              <a:t>05/06/2024</a:t>
+              <a:t>05/13/2024</a:t>
             </a:fld>
             <a:endParaRPr lang="LID4096"/>
           </a:p>
@@ -1184,7 +1184,7 @@
           <a:p>
             <a:fld id="{B7714D09-FDA9-401A-B706-95D8DDEA38E0}" type="datetimeFigureOut">
               <a:rPr lang="LID4096" smtClean="0"/>
-              <a:t>05/06/2024</a:t>
+              <a:t>05/13/2024</a:t>
             </a:fld>
             <a:endParaRPr lang="LID4096"/>
           </a:p>
@@ -1434,7 +1434,7 @@
           <a:p>
             <a:fld id="{B7714D09-FDA9-401A-B706-95D8DDEA38E0}" type="datetimeFigureOut">
               <a:rPr lang="LID4096" smtClean="0"/>
-              <a:t>05/06/2024</a:t>
+              <a:t>05/13/2024</a:t>
             </a:fld>
             <a:endParaRPr lang="LID4096"/>
           </a:p>
@@ -1742,7 +1742,7 @@
           <a:p>
             <a:fld id="{B7714D09-FDA9-401A-B706-95D8DDEA38E0}" type="datetimeFigureOut">
               <a:rPr lang="LID4096" smtClean="0"/>
-              <a:t>05/06/2024</a:t>
+              <a:t>05/13/2024</a:t>
             </a:fld>
             <a:endParaRPr lang="LID4096"/>
           </a:p>
@@ -2060,7 +2060,7 @@
           <a:p>
             <a:fld id="{B7714D09-FDA9-401A-B706-95D8DDEA38E0}" type="datetimeFigureOut">
               <a:rPr lang="LID4096" smtClean="0"/>
-              <a:t>05/06/2024</a:t>
+              <a:t>05/13/2024</a:t>
             </a:fld>
             <a:endParaRPr lang="LID4096"/>
           </a:p>
@@ -2362,7 +2362,7 @@
           <a:p>
             <a:fld id="{B7714D09-FDA9-401A-B706-95D8DDEA38E0}" type="datetimeFigureOut">
               <a:rPr lang="LID4096" smtClean="0"/>
-              <a:t>05/06/2024</a:t>
+              <a:t>05/13/2024</a:t>
             </a:fld>
             <a:endParaRPr lang="LID4096"/>
           </a:p>
@@ -2729,7 +2729,7 @@
           <a:p>
             <a:fld id="{B7714D09-FDA9-401A-B706-95D8DDEA38E0}" type="datetimeFigureOut">
               <a:rPr lang="LID4096" smtClean="0"/>
-              <a:t>05/06/2024</a:t>
+              <a:t>05/13/2024</a:t>
             </a:fld>
             <a:endParaRPr lang="LID4096"/>
           </a:p>
@@ -2903,7 +2903,7 @@
           <a:p>
             <a:fld id="{B7714D09-FDA9-401A-B706-95D8DDEA38E0}" type="datetimeFigureOut">
               <a:rPr lang="LID4096" smtClean="0"/>
-              <a:t>05/06/2024</a:t>
+              <a:t>05/13/2024</a:t>
             </a:fld>
             <a:endParaRPr lang="LID4096"/>
           </a:p>
@@ -3083,7 +3083,7 @@
           <a:p>
             <a:fld id="{B7714D09-FDA9-401A-B706-95D8DDEA38E0}" type="datetimeFigureOut">
               <a:rPr lang="LID4096" smtClean="0"/>
-              <a:t>05/06/2024</a:t>
+              <a:t>05/13/2024</a:t>
             </a:fld>
             <a:endParaRPr lang="LID4096"/>
           </a:p>
@@ -3253,7 +3253,7 @@
           <a:p>
             <a:fld id="{B7714D09-FDA9-401A-B706-95D8DDEA38E0}" type="datetimeFigureOut">
               <a:rPr lang="LID4096" smtClean="0"/>
-              <a:t>05/06/2024</a:t>
+              <a:t>05/13/2024</a:t>
             </a:fld>
             <a:endParaRPr lang="LID4096"/>
           </a:p>
@@ -3503,7 +3503,7 @@
           <a:p>
             <a:fld id="{B7714D09-FDA9-401A-B706-95D8DDEA38E0}" type="datetimeFigureOut">
               <a:rPr lang="LID4096" smtClean="0"/>
-              <a:t>05/06/2024</a:t>
+              <a:t>05/13/2024</a:t>
             </a:fld>
             <a:endParaRPr lang="LID4096"/>
           </a:p>
@@ -3739,7 +3739,7 @@
           <a:p>
             <a:fld id="{B7714D09-FDA9-401A-B706-95D8DDEA38E0}" type="datetimeFigureOut">
               <a:rPr lang="LID4096" smtClean="0"/>
-              <a:t>05/06/2024</a:t>
+              <a:t>05/13/2024</a:t>
             </a:fld>
             <a:endParaRPr lang="LID4096"/>
           </a:p>
@@ -4121,7 +4121,7 @@
           <a:p>
             <a:fld id="{B7714D09-FDA9-401A-B706-95D8DDEA38E0}" type="datetimeFigureOut">
               <a:rPr lang="LID4096" smtClean="0"/>
-              <a:t>05/06/2024</a:t>
+              <a:t>05/13/2024</a:t>
             </a:fld>
             <a:endParaRPr lang="LID4096"/>
           </a:p>
@@ -4239,7 +4239,7 @@
           <a:p>
             <a:fld id="{B7714D09-FDA9-401A-B706-95D8DDEA38E0}" type="datetimeFigureOut">
               <a:rPr lang="LID4096" smtClean="0"/>
-              <a:t>05/06/2024</a:t>
+              <a:t>05/13/2024</a:t>
             </a:fld>
             <a:endParaRPr lang="LID4096"/>
           </a:p>
@@ -4334,7 +4334,7 @@
           <a:p>
             <a:fld id="{B7714D09-FDA9-401A-B706-95D8DDEA38E0}" type="datetimeFigureOut">
               <a:rPr lang="LID4096" smtClean="0"/>
-              <a:t>05/06/2024</a:t>
+              <a:t>05/13/2024</a:t>
             </a:fld>
             <a:endParaRPr lang="LID4096"/>
           </a:p>
@@ -4589,7 +4589,7 @@
           <a:p>
             <a:fld id="{B7714D09-FDA9-401A-B706-95D8DDEA38E0}" type="datetimeFigureOut">
               <a:rPr lang="LID4096" smtClean="0"/>
-              <a:t>05/06/2024</a:t>
+              <a:t>05/13/2024</a:t>
             </a:fld>
             <a:endParaRPr lang="LID4096"/>
           </a:p>
@@ -4872,7 +4872,7 @@
           <a:p>
             <a:fld id="{B7714D09-FDA9-401A-B706-95D8DDEA38E0}" type="datetimeFigureOut">
               <a:rPr lang="LID4096" smtClean="0"/>
-              <a:t>05/06/2024</a:t>
+              <a:t>05/13/2024</a:t>
             </a:fld>
             <a:endParaRPr lang="LID4096"/>
           </a:p>
@@ -5278,7 +5278,7 @@
           <a:p>
             <a:fld id="{B7714D09-FDA9-401A-B706-95D8DDEA38E0}" type="datetimeFigureOut">
               <a:rPr lang="LID4096" smtClean="0"/>
-              <a:t>05/06/2024</a:t>
+              <a:t>05/13/2024</a:t>
             </a:fld>
             <a:endParaRPr lang="LID4096"/>
           </a:p>
@@ -6437,7 +6437,7 @@
                   </a:schemeClr>
                 </a:solidFill>
               </a:rPr>
-              <a:t>Doelgroep: Kinderen van 6 tot 10 jaar.</a:t>
+              <a:t>Doelgroep: 6-10 jaar.</a:t>
             </a:r>
           </a:p>
           <a:p>
@@ -8165,7 +8165,7 @@
           <a:p>
             <a:r>
               <a:rPr lang="nl-BE" dirty="0"/>
-              <a:t>Expansion</a:t>
+              <a:t>uitbreidingen</a:t>
             </a:r>
             <a:endParaRPr lang="LID4096" dirty="0"/>
           </a:p>

</xml_diff>

<commit_message>
add assets back to memory and edit ppt
</commit_message>
<xml_diff>
--- a/Educational_game_2.pptx
+++ b/Educational_game_2.pptx
@@ -6794,10 +6794,17 @@
           <a:lstStyle/>
           <a:p>
             <a:r>
-              <a:rPr lang="en-US" sz="1800" dirty="0" err="1"/>
-              <a:t>oilcleanup</a:t>
-            </a:r>
-            <a:endParaRPr lang="en-US" sz="1800" dirty="0"/>
+              <a:rPr lang="en-US" sz="1800" dirty="0"/>
+              <a:t>Oil</a:t>
+            </a:r>
+            <a:r>
+              <a:rPr lang="en-US" dirty="0"/>
+              <a:t> </a:t>
+            </a:r>
+            <a:r>
+              <a:rPr lang="en-US" sz="1800" dirty="0"/>
+              <a:t>cleanup</a:t>
+            </a:r>
           </a:p>
           <a:p>
             <a:pPr>
@@ -7588,6 +7595,11 @@
               <a:rPr lang="en-US" sz="1800" dirty="0"/>
               <a:t>factory </a:t>
             </a:r>
+            <a:r>
+              <a:rPr lang="en-US" sz="1800" dirty="0" err="1"/>
+              <a:t>wreking</a:t>
+            </a:r>
+            <a:endParaRPr lang="en-US" sz="1800" dirty="0"/>
           </a:p>
           <a:p>
             <a:pPr>
@@ -7776,130 +7788,6 @@
           </a:p>
         </p:txBody>
       </p:sp>
-      <p:sp>
-        <p:nvSpPr>
-          <p:cNvPr id="5" name="Tekstvak 4">
-            <a:extLst>
-              <a:ext uri="{FF2B5EF4-FFF2-40B4-BE49-F238E27FC236}">
-                <a16:creationId xmlns:a16="http://schemas.microsoft.com/office/drawing/2014/main" id="{7DF5930B-E04F-39FB-19DB-BBDE8F4FF0F8}"/>
-              </a:ext>
-            </a:extLst>
-          </p:cNvPr>
-          <p:cNvSpPr txBox="1"/>
-          <p:nvPr/>
-        </p:nvSpPr>
-        <p:spPr>
-          <a:xfrm>
-            <a:off x="4235120" y="2017579"/>
-            <a:ext cx="6105832" cy="800219"/>
-          </a:xfrm>
-          <a:prstGeom prst="rect">
-            <a:avLst/>
-          </a:prstGeom>
-          <a:noFill/>
-        </p:spPr>
-        <p:txBody>
-          <a:bodyPr wrap="square">
-            <a:spAutoFit/>
-          </a:bodyPr>
-          <a:lstStyle/>
-          <a:p>
-            <a:r>
-              <a:rPr lang="nl-BE" dirty="0" err="1"/>
-              <a:t>Choose</a:t>
-            </a:r>
-            <a:r>
-              <a:rPr lang="nl-BE" dirty="0"/>
-              <a:t> </a:t>
-            </a:r>
-            <a:r>
-              <a:rPr lang="nl-BE" dirty="0" err="1"/>
-              <a:t>the</a:t>
-            </a:r>
-            <a:r>
-              <a:rPr lang="nl-BE" dirty="0"/>
-              <a:t> correct</a:t>
-            </a:r>
-          </a:p>
-          <a:p>
-            <a:pPr>
-              <a:buFont typeface="Wingdings 3" panose="05040102010807070707" pitchFamily="18" charset="2"/>
-              <a:buChar char=""/>
-            </a:pPr>
-            <a:r>
-              <a:rPr lang="nl-NL" sz="1400" dirty="0">
-                <a:solidFill>
-                  <a:schemeClr val="bg2">
-                    <a:lumMod val="50000"/>
-                  </a:schemeClr>
-                </a:solidFill>
-              </a:rPr>
-              <a:t>Doel:</a:t>
-            </a:r>
-          </a:p>
-          <a:p>
-            <a:pPr>
-              <a:buFont typeface="Wingdings 3" panose="05040102010807070707" pitchFamily="18" charset="2"/>
-              <a:buChar char=""/>
-            </a:pPr>
-            <a:r>
-              <a:rPr lang="nl-NL" sz="1400" dirty="0">
-                <a:solidFill>
-                  <a:schemeClr val="bg2">
-                    <a:lumMod val="50000"/>
-                  </a:schemeClr>
-                </a:solidFill>
-              </a:rPr>
-              <a:t>Kan voor elk thema gebruikt worden</a:t>
-            </a:r>
-            <a:endParaRPr lang="nl-BE" sz="1400" dirty="0"/>
-          </a:p>
-        </p:txBody>
-      </p:sp>
-      <p:pic>
-        <p:nvPicPr>
-          <p:cNvPr id="6" name="Afbeelding 5">
-            <a:extLst>
-              <a:ext uri="{FF2B5EF4-FFF2-40B4-BE49-F238E27FC236}">
-                <a16:creationId xmlns:a16="http://schemas.microsoft.com/office/drawing/2014/main" id="{20ECFEFD-8ED0-77D8-F3D8-A80C7CEFCC1D}"/>
-              </a:ext>
-            </a:extLst>
-          </p:cNvPr>
-          <p:cNvPicPr>
-            <a:picLocks noChangeAspect="1"/>
-          </p:cNvPicPr>
-          <p:nvPr/>
-        </p:nvPicPr>
-        <p:blipFill rotWithShape="1">
-          <a:blip r:embed="rId2"/>
-          <a:srcRect l="55093" t="54116" r="-25" b="952"/>
-          <a:stretch/>
-        </p:blipFill>
-        <p:spPr>
-          <a:xfrm>
-            <a:off x="7878084" y="224101"/>
-            <a:ext cx="3490127" cy="1964559"/>
-          </a:xfrm>
-          <a:prstGeom prst="snip2DiagRect">
-            <a:avLst>
-              <a:gd name="adj1" fmla="val 13793"/>
-              <a:gd name="adj2" fmla="val 0"/>
-            </a:avLst>
-          </a:prstGeom>
-          <a:ln w="57150">
-            <a:solidFill>
-              <a:schemeClr val="tx1"/>
-            </a:solidFill>
-          </a:ln>
-          <a:effectLst>
-            <a:innerShdw blurRad="63500" dist="50800" dir="13500000">
-              <a:prstClr val="black">
-                <a:alpha val="50000"/>
-              </a:prstClr>
-            </a:innerShdw>
-          </a:effectLst>
-        </p:spPr>
-      </p:pic>
       <p:cxnSp>
         <p:nvCxnSpPr>
           <p:cNvPr id="8" name="Rechte verbindingslijn met pijl 7">
@@ -7941,6 +7829,50 @@
           </a:fontRef>
         </p:style>
       </p:cxnSp>
+      <p:pic>
+        <p:nvPicPr>
+          <p:cNvPr id="7" name="Afbeelding 6">
+            <a:extLst>
+              <a:ext uri="{FF2B5EF4-FFF2-40B4-BE49-F238E27FC236}">
+                <a16:creationId xmlns:a16="http://schemas.microsoft.com/office/drawing/2014/main" id="{8E57D1B5-6DDE-7D64-CDD1-3972B4672677}"/>
+              </a:ext>
+            </a:extLst>
+          </p:cNvPr>
+          <p:cNvPicPr>
+            <a:picLocks noChangeAspect="1"/>
+          </p:cNvPicPr>
+          <p:nvPr/>
+        </p:nvPicPr>
+        <p:blipFill rotWithShape="1">
+          <a:blip r:embed="rId2"/>
+          <a:srcRect l="6077" r="6226"/>
+          <a:stretch/>
+        </p:blipFill>
+        <p:spPr>
+          <a:xfrm>
+            <a:off x="613532" y="2949676"/>
+            <a:ext cx="3799185" cy="2536723"/>
+          </a:xfrm>
+          <a:prstGeom prst="snip2DiagRect">
+            <a:avLst>
+              <a:gd name="adj1" fmla="val 15581"/>
+              <a:gd name="adj2" fmla="val 0"/>
+            </a:avLst>
+          </a:prstGeom>
+          <a:ln w="76200">
+            <a:solidFill>
+              <a:schemeClr val="tx1"/>
+            </a:solidFill>
+          </a:ln>
+          <a:effectLst>
+            <a:innerShdw blurRad="63500" dist="50800" dir="13500000">
+              <a:prstClr val="black">
+                <a:alpha val="50000"/>
+              </a:prstClr>
+            </a:innerShdw>
+          </a:effectLst>
+        </p:spPr>
+      </p:pic>
     </p:spTree>
     <p:extLst>
       <p:ext uri="{BB962C8B-B14F-4D97-AF65-F5344CB8AC3E}">

</xml_diff>